<commit_message>
Updating the final project.
</commit_message>
<xml_diff>
--- a/Unit13/Chad_Madding_Unit 13 For Live Session.pptx
+++ b/Unit13/Chad_Madding_Unit 13 For Live Session.pptx
@@ -704,7 +704,7 @@
           <a:p>
             <a:fld id="{F91415B4-81E4-4AC4-90AB-397CCE382C1C}" type="datetimeFigureOut">
               <a:rPr lang="en-US" smtClean="0"/>
-              <a:t>3/29/2020</a:t>
+              <a:t>3/31/2020</a:t>
             </a:fld>
             <a:endParaRPr lang="en-US"/>
           </a:p>
@@ -1116,7 +1116,7 @@
           <a:p>
             <a:fld id="{1D8BD707-D9CF-40AE-B4C6-C98DA3205C09}" type="datetimeFigureOut">
               <a:rPr lang="en-US"/>
-              <a:t>3/29/2020</a:t>
+              <a:t>3/31/2020</a:t>
             </a:fld>
             <a:endParaRPr lang="en-US"/>
           </a:p>
@@ -1293,7 +1293,7 @@
           <a:p>
             <a:fld id="{1D8BD707-D9CF-40AE-B4C6-C98DA3205C09}" type="datetimeFigureOut">
               <a:rPr lang="en-US"/>
-              <a:t>3/29/2020</a:t>
+              <a:t>3/31/2020</a:t>
             </a:fld>
             <a:endParaRPr lang="en-US"/>
           </a:p>
@@ -1507,7 +1507,7 @@
           <a:p>
             <a:fld id="{1D8BD707-D9CF-40AE-B4C6-C98DA3205C09}" type="datetimeFigureOut">
               <a:rPr lang="en-US"/>
-              <a:t>3/29/2020</a:t>
+              <a:t>3/31/2020</a:t>
             </a:fld>
             <a:endParaRPr lang="en-US"/>
           </a:p>
@@ -1655,7 +1655,7 @@
           <a:p>
             <a:fld id="{1D8BD707-D9CF-40AE-B4C6-C98DA3205C09}" type="datetimeFigureOut">
               <a:rPr lang="en-US"/>
-              <a:t>3/29/2020</a:t>
+              <a:t>3/31/2020</a:t>
             </a:fld>
             <a:endParaRPr lang="en-US"/>
           </a:p>
@@ -1774,7 +1774,7 @@
           <a:p>
             <a:fld id="{1D8BD707-D9CF-40AE-B4C6-C98DA3205C09}" type="datetimeFigureOut">
               <a:rPr lang="en-US"/>
-              <a:t>3/29/2020</a:t>
+              <a:t>3/31/2020</a:t>
             </a:fld>
             <a:endParaRPr lang="en-US"/>
           </a:p>
@@ -2091,7 +2091,7 @@
           <a:p>
             <a:fld id="{1D8BD707-D9CF-40AE-B4C6-C98DA3205C09}" type="datetimeFigureOut">
               <a:rPr lang="en-US"/>
-              <a:t>3/29/2020</a:t>
+              <a:t>3/31/2020</a:t>
             </a:fld>
             <a:endParaRPr lang="en-US"/>
           </a:p>
@@ -8098,7 +8098,7 @@
                 <a:ea typeface="Cambria" panose="02040503050406030204" pitchFamily="18" charset="0"/>
                 <a:cs typeface="Times New Roman" panose="02020603050405020304" pitchFamily="18" charset="0"/>
               </a:rPr>
-              <a:t>## MLP fit with 5 hidden nodes and 50 repetitions.</a:t>
+              <a:t>## MLP fit with 5 and 50 repetitions. hidden nodes </a:t>
             </a:r>
             <a:br>
               <a:rPr lang="en-US" sz="1000" dirty="0">
@@ -21347,6 +21347,57 @@
 </file>
 
 <file path=customXml/item2.xml><?xml version="1.0" encoding="utf-8"?>
+<p:properties xmlns:p="http://schemas.microsoft.com/office/2006/metadata/properties" xmlns:xsi="http://www.w3.org/2001/XMLSchema-instance" xmlns:pc="http://schemas.microsoft.com/office/infopath/2007/PartnerControls">
+  <documentManagement>
+    <Has_Teacher_Only_SectionGroup xmlns="97c6e5db-c33c-4bd7-a101-5236bf2afbce" xsi:nil="true"/>
+    <FolderType xmlns="97c6e5db-c33c-4bd7-a101-5236bf2afbce" xsi:nil="true"/>
+    <TeamsChannelId xmlns="97c6e5db-c33c-4bd7-a101-5236bf2afbce" xsi:nil="true"/>
+    <Invited_Teachers xmlns="97c6e5db-c33c-4bd7-a101-5236bf2afbce" xsi:nil="true"/>
+    <Invited_Students xmlns="97c6e5db-c33c-4bd7-a101-5236bf2afbce" xsi:nil="true"/>
+    <IsNotebookLocked xmlns="97c6e5db-c33c-4bd7-a101-5236bf2afbce" xsi:nil="true"/>
+    <Templates xmlns="97c6e5db-c33c-4bd7-a101-5236bf2afbce" xsi:nil="true"/>
+    <Self_Registration_Enabled xmlns="97c6e5db-c33c-4bd7-a101-5236bf2afbce" xsi:nil="true"/>
+    <Teachers xmlns="97c6e5db-c33c-4bd7-a101-5236bf2afbce">
+      <UserInfo>
+        <DisplayName/>
+        <AccountId xsi:nil="true"/>
+        <AccountType/>
+      </UserInfo>
+    </Teachers>
+    <Distribution_Groups xmlns="97c6e5db-c33c-4bd7-a101-5236bf2afbce" xsi:nil="true"/>
+    <LMS_Mappings xmlns="97c6e5db-c33c-4bd7-a101-5236bf2afbce" xsi:nil="true"/>
+    <CultureName xmlns="97c6e5db-c33c-4bd7-a101-5236bf2afbce" xsi:nil="true"/>
+    <AppVersion xmlns="97c6e5db-c33c-4bd7-a101-5236bf2afbce" xsi:nil="true"/>
+    <DefaultSectionNames xmlns="97c6e5db-c33c-4bd7-a101-5236bf2afbce" xsi:nil="true"/>
+    <NotebookType xmlns="97c6e5db-c33c-4bd7-a101-5236bf2afbce" xsi:nil="true"/>
+    <Student_Groups xmlns="97c6e5db-c33c-4bd7-a101-5236bf2afbce">
+      <UserInfo>
+        <DisplayName/>
+        <AccountId xsi:nil="true"/>
+        <AccountType/>
+      </UserInfo>
+    </Student_Groups>
+    <Math_Settings xmlns="97c6e5db-c33c-4bd7-a101-5236bf2afbce" xsi:nil="true"/>
+    <Owner xmlns="97c6e5db-c33c-4bd7-a101-5236bf2afbce">
+      <UserInfo>
+        <DisplayName/>
+        <AccountId xsi:nil="true"/>
+        <AccountType/>
+      </UserInfo>
+    </Owner>
+    <Students xmlns="97c6e5db-c33c-4bd7-a101-5236bf2afbce">
+      <UserInfo>
+        <DisplayName/>
+        <AccountId xsi:nil="true"/>
+        <AccountType/>
+      </UserInfo>
+    </Students>
+    <Is_Collaboration_Space_Locked xmlns="97c6e5db-c33c-4bd7-a101-5236bf2afbce" xsi:nil="true"/>
+  </documentManagement>
+</p:properties>
+</file>
+
+<file path=customXml/item3.xml><?xml version="1.0" encoding="utf-8"?>
 <ct:contentTypeSchema xmlns:ct="http://schemas.microsoft.com/office/2006/metadata/contentType" xmlns:ma="http://schemas.microsoft.com/office/2006/metadata/properties/metaAttributes" ct:_="" ma:_="" ma:contentTypeName="Document" ma:contentTypeID="0x010100016C90B901C3EC44825A78A1153541DA" ma:contentTypeVersion="27" ma:contentTypeDescription="Create a new document." ma:contentTypeScope="" ma:versionID="999fe549cf25460b4fcf88f84cab17f3">
   <xsd:schema xmlns:xsd="http://www.w3.org/2001/XMLSchema" xmlns:xs="http://www.w3.org/2001/XMLSchema" xmlns:p="http://schemas.microsoft.com/office/2006/metadata/properties" xmlns:ns3="45275255-e281-4b44-b903-5981a693d228" xmlns:ns4="97c6e5db-c33c-4bd7-a101-5236bf2afbce" targetNamespace="http://schemas.microsoft.com/office/2006/metadata/properties" ma:root="true" ma:fieldsID="2a08fd787345cebc6fbdbe03680d6c02" ns3:_="" ns4:_="">
     <xsd:import namespace="45275255-e281-4b44-b903-5981a693d228"/>
@@ -21719,57 +21770,6 @@
 </ct:contentTypeSchema>
 </file>
 
-<file path=customXml/item3.xml><?xml version="1.0" encoding="utf-8"?>
-<p:properties xmlns:p="http://schemas.microsoft.com/office/2006/metadata/properties" xmlns:xsi="http://www.w3.org/2001/XMLSchema-instance" xmlns:pc="http://schemas.microsoft.com/office/infopath/2007/PartnerControls">
-  <documentManagement>
-    <Has_Teacher_Only_SectionGroup xmlns="97c6e5db-c33c-4bd7-a101-5236bf2afbce" xsi:nil="true"/>
-    <FolderType xmlns="97c6e5db-c33c-4bd7-a101-5236bf2afbce" xsi:nil="true"/>
-    <TeamsChannelId xmlns="97c6e5db-c33c-4bd7-a101-5236bf2afbce" xsi:nil="true"/>
-    <Invited_Teachers xmlns="97c6e5db-c33c-4bd7-a101-5236bf2afbce" xsi:nil="true"/>
-    <Invited_Students xmlns="97c6e5db-c33c-4bd7-a101-5236bf2afbce" xsi:nil="true"/>
-    <IsNotebookLocked xmlns="97c6e5db-c33c-4bd7-a101-5236bf2afbce" xsi:nil="true"/>
-    <Templates xmlns="97c6e5db-c33c-4bd7-a101-5236bf2afbce" xsi:nil="true"/>
-    <Self_Registration_Enabled xmlns="97c6e5db-c33c-4bd7-a101-5236bf2afbce" xsi:nil="true"/>
-    <Teachers xmlns="97c6e5db-c33c-4bd7-a101-5236bf2afbce">
-      <UserInfo>
-        <DisplayName/>
-        <AccountId xsi:nil="true"/>
-        <AccountType/>
-      </UserInfo>
-    </Teachers>
-    <Distribution_Groups xmlns="97c6e5db-c33c-4bd7-a101-5236bf2afbce" xsi:nil="true"/>
-    <LMS_Mappings xmlns="97c6e5db-c33c-4bd7-a101-5236bf2afbce" xsi:nil="true"/>
-    <CultureName xmlns="97c6e5db-c33c-4bd7-a101-5236bf2afbce" xsi:nil="true"/>
-    <AppVersion xmlns="97c6e5db-c33c-4bd7-a101-5236bf2afbce" xsi:nil="true"/>
-    <DefaultSectionNames xmlns="97c6e5db-c33c-4bd7-a101-5236bf2afbce" xsi:nil="true"/>
-    <NotebookType xmlns="97c6e5db-c33c-4bd7-a101-5236bf2afbce" xsi:nil="true"/>
-    <Student_Groups xmlns="97c6e5db-c33c-4bd7-a101-5236bf2afbce">
-      <UserInfo>
-        <DisplayName/>
-        <AccountId xsi:nil="true"/>
-        <AccountType/>
-      </UserInfo>
-    </Student_Groups>
-    <Math_Settings xmlns="97c6e5db-c33c-4bd7-a101-5236bf2afbce" xsi:nil="true"/>
-    <Owner xmlns="97c6e5db-c33c-4bd7-a101-5236bf2afbce">
-      <UserInfo>
-        <DisplayName/>
-        <AccountId xsi:nil="true"/>
-        <AccountType/>
-      </UserInfo>
-    </Owner>
-    <Students xmlns="97c6e5db-c33c-4bd7-a101-5236bf2afbce">
-      <UserInfo>
-        <DisplayName/>
-        <AccountId xsi:nil="true"/>
-        <AccountType/>
-      </UserInfo>
-    </Students>
-    <Is_Collaboration_Space_Locked xmlns="97c6e5db-c33c-4bd7-a101-5236bf2afbce" xsi:nil="true"/>
-  </documentManagement>
-</p:properties>
-</file>
-
 <file path=customXml/itemProps1.xml><?xml version="1.0" encoding="utf-8"?>
 <ds:datastoreItem xmlns:ds="http://schemas.openxmlformats.org/officeDocument/2006/customXml" ds:itemID="{CB135F17-3837-4A0D-8708-59889F6AEE8F}">
   <ds:schemaRefs>
@@ -21779,6 +21779,23 @@
 </file>
 
 <file path=customXml/itemProps2.xml><?xml version="1.0" encoding="utf-8"?>
+<ds:datastoreItem xmlns:ds="http://schemas.openxmlformats.org/officeDocument/2006/customXml" ds:itemID="{47E49D3D-9BB5-4483-BACD-C57A47EAA186}">
+  <ds:schemaRefs>
+    <ds:schemaRef ds:uri="97c6e5db-c33c-4bd7-a101-5236bf2afbce"/>
+    <ds:schemaRef ds:uri="http://www.w3.org/XML/1998/namespace"/>
+    <ds:schemaRef ds:uri="http://purl.org/dc/elements/1.1/"/>
+    <ds:schemaRef ds:uri="45275255-e281-4b44-b903-5981a693d228"/>
+    <ds:schemaRef ds:uri="http://purl.org/dc/terms/"/>
+    <ds:schemaRef ds:uri="http://schemas.microsoft.com/office/2006/documentManagement/types"/>
+    <ds:schemaRef ds:uri="http://schemas.microsoft.com/office/infopath/2007/PartnerControls"/>
+    <ds:schemaRef ds:uri="http://schemas.openxmlformats.org/package/2006/metadata/core-properties"/>
+    <ds:schemaRef ds:uri="http://schemas.microsoft.com/office/2006/metadata/properties"/>
+    <ds:schemaRef ds:uri="http://purl.org/dc/dcmitype/"/>
+  </ds:schemaRefs>
+</ds:datastoreItem>
+</file>
+
+<file path=customXml/itemProps3.xml><?xml version="1.0" encoding="utf-8"?>
 <ds:datastoreItem xmlns:ds="http://schemas.openxmlformats.org/officeDocument/2006/customXml" ds:itemID="{842F7DB0-A124-4449-9A22-ECCB9C967790}">
   <ds:schemaRefs>
     <ds:schemaRef ds:uri="http://schemas.microsoft.com/office/2006/metadata/contentType"/>
@@ -21795,21 +21812,4 @@
     <ds:schemaRef ds:uri="http://schemas.microsoft.com/internal/obd"/>
   </ds:schemaRefs>
 </ds:datastoreItem>
-</file>
-
-<file path=customXml/itemProps3.xml><?xml version="1.0" encoding="utf-8"?>
-<ds:datastoreItem xmlns:ds="http://schemas.openxmlformats.org/officeDocument/2006/customXml" ds:itemID="{47E49D3D-9BB5-4483-BACD-C57A47EAA186}">
-  <ds:schemaRefs>
-    <ds:schemaRef ds:uri="97c6e5db-c33c-4bd7-a101-5236bf2afbce"/>
-    <ds:schemaRef ds:uri="http://www.w3.org/XML/1998/namespace"/>
-    <ds:schemaRef ds:uri="http://purl.org/dc/elements/1.1/"/>
-    <ds:schemaRef ds:uri="45275255-e281-4b44-b903-5981a693d228"/>
-    <ds:schemaRef ds:uri="http://purl.org/dc/terms/"/>
-    <ds:schemaRef ds:uri="http://schemas.microsoft.com/office/2006/documentManagement/types"/>
-    <ds:schemaRef ds:uri="http://schemas.microsoft.com/office/infopath/2007/PartnerControls"/>
-    <ds:schemaRef ds:uri="http://schemas.openxmlformats.org/package/2006/metadata/core-properties"/>
-    <ds:schemaRef ds:uri="http://schemas.microsoft.com/office/2006/metadata/properties"/>
-    <ds:schemaRef ds:uri="http://purl.org/dc/dcmitype/"/>
-  </ds:schemaRefs>
-</ds:datastoreItem>
 </file>
</xml_diff>